<commit_message>
Update 2021 12 04
</commit_message>
<xml_diff>
--- a/DATOS COVID Chile 2021 11 20.pptx
+++ b/DATOS COVID Chile 2021 11 20.pptx
@@ -214,7 +214,7 @@
           <a:p>
             <a:fld id="{447835AC-B937-DC4F-A9AF-DDEA21463513}" type="datetimeFigureOut">
               <a:rPr lang="en-US" smtClean="0"/>
-              <a:t>11/13/21</a:t>
+              <a:t>11/20/21</a:t>
             </a:fld>
             <a:endParaRPr lang="en-US"/>
           </a:p>
@@ -1296,7 +1296,7 @@
           <a:p>
             <a:fld id="{30EEB29E-0F50-7548-8684-F241B8F328C1}" type="datetimeFigureOut">
               <a:rPr lang="en-US" smtClean="0"/>
-              <a:t>11/13/21</a:t>
+              <a:t>11/20/21</a:t>
             </a:fld>
             <a:endParaRPr lang="en-US"/>
           </a:p>
@@ -1494,7 +1494,7 @@
           <a:p>
             <a:fld id="{30EEB29E-0F50-7548-8684-F241B8F328C1}" type="datetimeFigureOut">
               <a:rPr lang="en-US" smtClean="0"/>
-              <a:t>11/13/21</a:t>
+              <a:t>11/20/21</a:t>
             </a:fld>
             <a:endParaRPr lang="en-US"/>
           </a:p>
@@ -1702,7 +1702,7 @@
           <a:p>
             <a:fld id="{30EEB29E-0F50-7548-8684-F241B8F328C1}" type="datetimeFigureOut">
               <a:rPr lang="en-US" smtClean="0"/>
-              <a:t>11/13/21</a:t>
+              <a:t>11/20/21</a:t>
             </a:fld>
             <a:endParaRPr lang="en-US"/>
           </a:p>
@@ -1900,7 +1900,7 @@
           <a:p>
             <a:fld id="{30EEB29E-0F50-7548-8684-F241B8F328C1}" type="datetimeFigureOut">
               <a:rPr lang="en-US" smtClean="0"/>
-              <a:t>11/13/21</a:t>
+              <a:t>11/20/21</a:t>
             </a:fld>
             <a:endParaRPr lang="en-US"/>
           </a:p>
@@ -2175,7 +2175,7 @@
           <a:p>
             <a:fld id="{30EEB29E-0F50-7548-8684-F241B8F328C1}" type="datetimeFigureOut">
               <a:rPr lang="en-US" smtClean="0"/>
-              <a:t>11/13/21</a:t>
+              <a:t>11/20/21</a:t>
             </a:fld>
             <a:endParaRPr lang="en-US"/>
           </a:p>
@@ -2440,7 +2440,7 @@
           <a:p>
             <a:fld id="{30EEB29E-0F50-7548-8684-F241B8F328C1}" type="datetimeFigureOut">
               <a:rPr lang="en-US" smtClean="0"/>
-              <a:t>11/13/21</a:t>
+              <a:t>11/20/21</a:t>
             </a:fld>
             <a:endParaRPr lang="en-US"/>
           </a:p>
@@ -2852,7 +2852,7 @@
           <a:p>
             <a:fld id="{30EEB29E-0F50-7548-8684-F241B8F328C1}" type="datetimeFigureOut">
               <a:rPr lang="en-US" smtClean="0"/>
-              <a:t>11/13/21</a:t>
+              <a:t>11/20/21</a:t>
             </a:fld>
             <a:endParaRPr lang="en-US"/>
           </a:p>
@@ -2993,7 +2993,7 @@
           <a:p>
             <a:fld id="{30EEB29E-0F50-7548-8684-F241B8F328C1}" type="datetimeFigureOut">
               <a:rPr lang="en-US" smtClean="0"/>
-              <a:t>11/13/21</a:t>
+              <a:t>11/20/21</a:t>
             </a:fld>
             <a:endParaRPr lang="en-US"/>
           </a:p>
@@ -3106,7 +3106,7 @@
           <a:p>
             <a:fld id="{30EEB29E-0F50-7548-8684-F241B8F328C1}" type="datetimeFigureOut">
               <a:rPr lang="en-US" smtClean="0"/>
-              <a:t>11/13/21</a:t>
+              <a:t>11/20/21</a:t>
             </a:fld>
             <a:endParaRPr lang="en-US"/>
           </a:p>
@@ -3529,7 +3529,7 @@
           <a:p>
             <a:fld id="{30EEB29E-0F50-7548-8684-F241B8F328C1}" type="datetimeFigureOut">
               <a:rPr lang="en-US" smtClean="0"/>
-              <a:t>11/13/21</a:t>
+              <a:t>11/20/21</a:t>
             </a:fld>
             <a:endParaRPr lang="en-US"/>
           </a:p>
@@ -3817,7 +3817,7 @@
           <a:p>
             <a:fld id="{30EEB29E-0F50-7548-8684-F241B8F328C1}" type="datetimeFigureOut">
               <a:rPr lang="en-US" smtClean="0"/>
-              <a:t>11/13/21</a:t>
+              <a:t>11/20/21</a:t>
             </a:fld>
             <a:endParaRPr lang="en-US"/>
           </a:p>
@@ -4058,7 +4058,7 @@
           <a:p>
             <a:fld id="{30EEB29E-0F50-7548-8684-F241B8F328C1}" type="datetimeFigureOut">
               <a:rPr lang="en-US" smtClean="0"/>
-              <a:t>11/13/21</a:t>
+              <a:t>11/20/21</a:t>
             </a:fld>
             <a:endParaRPr lang="en-US"/>
           </a:p>
@@ -5007,8 +5007,8 @@
         </p:nvSpPr>
         <p:spPr>
           <a:xfrm>
-            <a:off x="800003" y="28135"/>
-            <a:ext cx="10592002" cy="892552"/>
+            <a:off x="2419038" y="28135"/>
+            <a:ext cx="7353936" cy="892552"/>
           </a:xfrm>
           <a:prstGeom prst="rect">
             <a:avLst/>
@@ -5024,7 +5024,7 @@
             <a:pPr algn="ctr"/>
             <a:r>
               <a:rPr lang="en-US" sz="3200" dirty="0"/>
-              <a:t>NIVEL DE TRANSMISIÓN COMUNITARIA al 20 </a:t>
+              <a:t>NIVEL DE CONTAGIO al 20 </a:t>
             </a:r>
             <a:r>
               <a:rPr lang="en-US" sz="3200" dirty="0" err="1"/>
@@ -5180,8 +5180,8 @@
         </p:nvSpPr>
         <p:spPr>
           <a:xfrm>
-            <a:off x="800003" y="28135"/>
-            <a:ext cx="10592002" cy="892552"/>
+            <a:off x="2419038" y="28135"/>
+            <a:ext cx="7353936" cy="892552"/>
           </a:xfrm>
           <a:prstGeom prst="rect">
             <a:avLst/>
@@ -5197,7 +5197,7 @@
             <a:pPr algn="ctr"/>
             <a:r>
               <a:rPr lang="en-US" sz="3200" dirty="0"/>
-              <a:t>NIVEL DE TRANSMISIÓN COMUNITARIA al 20 </a:t>
+              <a:t>NIVEL DE CONTAGIO al 20 </a:t>
             </a:r>
             <a:r>
               <a:rPr lang="en-US" sz="3200" dirty="0" err="1"/>
@@ -7320,7 +7320,7 @@
         <p:spPr>
           <a:xfrm>
             <a:off x="188534" y="128200"/>
-            <a:ext cx="5785995" cy="954107"/>
+            <a:ext cx="6068989" cy="1323439"/>
           </a:xfrm>
           <a:prstGeom prst="rect">
             <a:avLst/>
@@ -7361,11 +7361,26 @@
             </a:r>
             <a:r>
               <a:rPr lang="en-US" sz="2400" dirty="0" err="1"/>
+              <a:t>confirmados</a:t>
+            </a:r>
+            <a:r>
+              <a:rPr lang="en-US" sz="2400" dirty="0"/>
+              <a:t> </a:t>
+            </a:r>
+            <a:r>
+              <a:rPr lang="en-US" sz="2400" dirty="0" err="1"/>
               <a:t>diarios</a:t>
             </a:r>
             <a:r>
               <a:rPr lang="en-US" sz="2400" dirty="0"/>
-              <a:t> x 100 mil </a:t>
+              <a:t> </a:t>
+            </a:r>
+          </a:p>
+          <a:p>
+            <a:pPr algn="ctr"/>
+            <a:r>
+              <a:rPr lang="en-US" sz="2400" dirty="0"/>
+              <a:t>x 100 mil </a:t>
             </a:r>
             <a:r>
               <a:rPr lang="en-US" sz="2400" dirty="0" err="1"/>

</xml_diff>